<commit_message>
Add all the command require to operate Git in Git_Commands.txt, it could be found in Kid Help Line
</commit_message>
<xml_diff>
--- a/Lessons/Git User Manual.pptx
+++ b/Lessons/Git User Manual.pptx
@@ -8813,7 +8813,7 @@
           <a:p>
             <a:r>
               <a:rPr lang="en-US" dirty="0"/>
-              <a:t>We will probably only use “-h” or “-help”. This will give you a quick guide on available options for Git command and format. For more help, use other options that I will not be discuss because I am a lazy person. Help yourself.</a:t>
+              <a:t>We will probably only use “-h” or “--help”. This will give you a quick guide on available options for Git command and format. For more help, use other options that I will not be discuss because I am a lazy person. Help yourself.</a:t>
             </a:r>
           </a:p>
         </p:txBody>
@@ -11333,7 +11333,7 @@
           <a:p>
             <a:r>
               <a:rPr lang="en-US" dirty="0"/>
-              <a:t>Tracking New files:</a:t>
+              <a:t>Tracking New Files:</a:t>
             </a:r>
           </a:p>
         </p:txBody>
@@ -11382,10 +11382,10 @@
       </p:sp>
       <p:sp>
         <p:nvSpPr>
-          <p:cNvPr id="4" name="Title 1">
+          <p:cNvPr id="6" name="Title 1">
             <a:extLst>
               <a:ext uri="{FF2B5EF4-FFF2-40B4-BE49-F238E27FC236}">
-                <a16:creationId xmlns:a16="http://schemas.microsoft.com/office/drawing/2014/main" id="{17901998-4E84-4F81-BF7C-11738253BA43}"/>
+                <a16:creationId xmlns:a16="http://schemas.microsoft.com/office/drawing/2014/main" id="{DE641C85-D67F-45F1-86FD-4D5176EBC452}"/>
               </a:ext>
             </a:extLst>
           </p:cNvPr>
@@ -11396,35 +11396,88 @@
         </p:nvSpPr>
         <p:spPr>
           <a:xfrm>
-            <a:off x="838200" y="2766218"/>
-            <a:ext cx="10515600" cy="1325563"/>
+            <a:off x="677334" y="2672160"/>
+            <a:ext cx="8596668" cy="1320800"/>
           </a:xfrm>
           <a:prstGeom prst="rect">
             <a:avLst/>
           </a:prstGeom>
         </p:spPr>
         <p:txBody>
-          <a:bodyPr vert="horz" lIns="91440" tIns="45720" rIns="91440" bIns="45720" rtlCol="0" anchor="ctr">
+          <a:bodyPr vert="horz" lIns="91440" tIns="45720" rIns="91440" bIns="45720" rtlCol="0" anchor="t">
             <a:normAutofit/>
           </a:bodyPr>
           <a:lstStyle>
-            <a:lvl1pPr algn="l" defTabSz="914400" rtl="0" eaLnBrk="1" latinLnBrk="0" hangingPunct="1">
-              <a:lnSpc>
-                <a:spcPct val="90000"/>
-              </a:lnSpc>
+            <a:lvl1pPr algn="l" defTabSz="457200" rtl="0" eaLnBrk="1" latinLnBrk="0" hangingPunct="1">
               <a:spcBef>
                 <a:spcPct val="0"/>
               </a:spcBef>
               <a:buNone/>
-              <a:defRPr sz="4400" kern="1200">
+              <a:defRPr sz="3600" kern="1200">
                 <a:solidFill>
-                  <a:schemeClr val="tx1"/>
+                  <a:schemeClr val="accent1"/>
                 </a:solidFill>
                 <a:latin typeface="+mj-lt"/>
                 <a:ea typeface="+mj-ea"/>
                 <a:cs typeface="+mj-cs"/>
               </a:defRPr>
             </a:lvl1pPr>
+            <a:lvl2pPr eaLnBrk="1" hangingPunct="1">
+              <a:defRPr>
+                <a:solidFill>
+                  <a:schemeClr val="tx2"/>
+                </a:solidFill>
+              </a:defRPr>
+            </a:lvl2pPr>
+            <a:lvl3pPr eaLnBrk="1" hangingPunct="1">
+              <a:defRPr>
+                <a:solidFill>
+                  <a:schemeClr val="tx2"/>
+                </a:solidFill>
+              </a:defRPr>
+            </a:lvl3pPr>
+            <a:lvl4pPr eaLnBrk="1" hangingPunct="1">
+              <a:defRPr>
+                <a:solidFill>
+                  <a:schemeClr val="tx2"/>
+                </a:solidFill>
+              </a:defRPr>
+            </a:lvl4pPr>
+            <a:lvl5pPr eaLnBrk="1" hangingPunct="1">
+              <a:defRPr>
+                <a:solidFill>
+                  <a:schemeClr val="tx2"/>
+                </a:solidFill>
+              </a:defRPr>
+            </a:lvl5pPr>
+            <a:lvl6pPr eaLnBrk="1" hangingPunct="1">
+              <a:defRPr>
+                <a:solidFill>
+                  <a:schemeClr val="tx2"/>
+                </a:solidFill>
+              </a:defRPr>
+            </a:lvl6pPr>
+            <a:lvl7pPr eaLnBrk="1" hangingPunct="1">
+              <a:defRPr>
+                <a:solidFill>
+                  <a:schemeClr val="tx2"/>
+                </a:solidFill>
+              </a:defRPr>
+            </a:lvl7pPr>
+            <a:lvl8pPr eaLnBrk="1" hangingPunct="1">
+              <a:defRPr>
+                <a:solidFill>
+                  <a:schemeClr val="tx2"/>
+                </a:solidFill>
+              </a:defRPr>
+            </a:lvl8pPr>
+            <a:lvl9pPr eaLnBrk="1" hangingPunct="1">
+              <a:defRPr>
+                <a:solidFill>
+                  <a:schemeClr val="tx2"/>
+                </a:solidFill>
+              </a:defRPr>
+            </a:lvl9pPr>
           </a:lstStyle>
           <a:p>
             <a:r>
@@ -11436,10 +11489,10 @@
       </p:sp>
       <p:sp>
         <p:nvSpPr>
-          <p:cNvPr id="5" name="Content Placeholder 2">
+          <p:cNvPr id="7" name="Content Placeholder 2">
             <a:extLst>
               <a:ext uri="{FF2B5EF4-FFF2-40B4-BE49-F238E27FC236}">
-                <a16:creationId xmlns:a16="http://schemas.microsoft.com/office/drawing/2014/main" id="{06F3BF93-A2FF-439E-857A-F35E5CCD1FBB}"/>
+                <a16:creationId xmlns:a16="http://schemas.microsoft.com/office/drawing/2014/main" id="{72B827C1-DB6C-477A-8E95-2213FE54BAFC}"/>
               </a:ext>
             </a:extLst>
           </p:cNvPr>
@@ -11450,7 +11503,7 @@
         </p:nvSpPr>
         <p:spPr>
           <a:xfrm>
-            <a:off x="838200" y="3654425"/>
+            <a:off x="677334" y="3332560"/>
             <a:ext cx="10515600" cy="4351338"/>
           </a:xfrm>
           <a:prstGeom prst="rect">
@@ -11462,162 +11515,225 @@
             <a:normAutofit/>
           </a:bodyPr>
           <a:lstStyle>
-            <a:lvl1pPr marL="228600" indent="-228600" algn="l" defTabSz="914400" rtl="0" eaLnBrk="1" latinLnBrk="0" hangingPunct="1">
-              <a:lnSpc>
-                <a:spcPct val="90000"/>
-              </a:lnSpc>
+            <a:lvl1pPr marL="342900" indent="-342900" algn="l" defTabSz="457200" rtl="0" eaLnBrk="1" latinLnBrk="0" hangingPunct="1">
               <a:spcBef>
                 <a:spcPts val="1000"/>
               </a:spcBef>
-              <a:buFont typeface="Arial" panose="020B0604020202020204" pitchFamily="34" charset="0"/>
-              <a:buChar char="•"/>
-              <a:defRPr sz="2800" kern="1200">
+              <a:spcAft>
+                <a:spcPts val="0"/>
+              </a:spcAft>
+              <a:buClr>
+                <a:schemeClr val="accent1"/>
+              </a:buClr>
+              <a:buSzPct val="80000"/>
+              <a:buFont typeface="Wingdings 3" charset="2"/>
+              <a:buChar char=""/>
+              <a:defRPr sz="1800" kern="1200">
                 <a:solidFill>
-                  <a:schemeClr val="tx1"/>
+                  <a:schemeClr val="tx1">
+                    <a:lumMod val="75000"/>
+                    <a:lumOff val="25000"/>
+                  </a:schemeClr>
                 </a:solidFill>
                 <a:latin typeface="+mn-lt"/>
                 <a:ea typeface="+mn-ea"/>
                 <a:cs typeface="+mn-cs"/>
               </a:defRPr>
             </a:lvl1pPr>
-            <a:lvl2pPr marL="685800" indent="-228600" algn="l" defTabSz="914400" rtl="0" eaLnBrk="1" latinLnBrk="0" hangingPunct="1">
-              <a:lnSpc>
-                <a:spcPct val="90000"/>
-              </a:lnSpc>
+            <a:lvl2pPr marL="742950" indent="-285750" algn="l" defTabSz="457200" rtl="0" eaLnBrk="1" latinLnBrk="0" hangingPunct="1">
               <a:spcBef>
-                <a:spcPts val="500"/>
+                <a:spcPts val="1000"/>
               </a:spcBef>
-              <a:buFont typeface="Arial" panose="020B0604020202020204" pitchFamily="34" charset="0"/>
-              <a:buChar char="•"/>
-              <a:defRPr sz="2400" kern="1200">
+              <a:spcAft>
+                <a:spcPts val="0"/>
+              </a:spcAft>
+              <a:buClr>
+                <a:schemeClr val="accent1"/>
+              </a:buClr>
+              <a:buSzPct val="80000"/>
+              <a:buFont typeface="Wingdings 3" charset="2"/>
+              <a:buChar char=""/>
+              <a:defRPr sz="1600" kern="1200">
                 <a:solidFill>
-                  <a:schemeClr val="tx1"/>
+                  <a:schemeClr val="tx1">
+                    <a:lumMod val="75000"/>
+                    <a:lumOff val="25000"/>
+                  </a:schemeClr>
                 </a:solidFill>
                 <a:latin typeface="+mn-lt"/>
                 <a:ea typeface="+mn-ea"/>
                 <a:cs typeface="+mn-cs"/>
               </a:defRPr>
             </a:lvl2pPr>
-            <a:lvl3pPr marL="1143000" indent="-228600" algn="l" defTabSz="914400" rtl="0" eaLnBrk="1" latinLnBrk="0" hangingPunct="1">
-              <a:lnSpc>
-                <a:spcPct val="90000"/>
-              </a:lnSpc>
+            <a:lvl3pPr marL="1143000" indent="-228600" algn="l" defTabSz="457200" rtl="0" eaLnBrk="1" latinLnBrk="0" hangingPunct="1">
               <a:spcBef>
-                <a:spcPts val="500"/>
+                <a:spcPts val="1000"/>
               </a:spcBef>
-              <a:buFont typeface="Arial" panose="020B0604020202020204" pitchFamily="34" charset="0"/>
-              <a:buChar char="•"/>
-              <a:defRPr sz="2000" kern="1200">
+              <a:spcAft>
+                <a:spcPts val="0"/>
+              </a:spcAft>
+              <a:buClr>
+                <a:schemeClr val="accent1"/>
+              </a:buClr>
+              <a:buSzPct val="80000"/>
+              <a:buFont typeface="Wingdings 3" charset="2"/>
+              <a:buChar char=""/>
+              <a:defRPr sz="1400" kern="1200">
                 <a:solidFill>
-                  <a:schemeClr val="tx1"/>
+                  <a:schemeClr val="tx1">
+                    <a:lumMod val="75000"/>
+                    <a:lumOff val="25000"/>
+                  </a:schemeClr>
                 </a:solidFill>
                 <a:latin typeface="+mn-lt"/>
                 <a:ea typeface="+mn-ea"/>
                 <a:cs typeface="+mn-cs"/>
               </a:defRPr>
             </a:lvl3pPr>
-            <a:lvl4pPr marL="1600200" indent="-228600" algn="l" defTabSz="914400" rtl="0" eaLnBrk="1" latinLnBrk="0" hangingPunct="1">
-              <a:lnSpc>
-                <a:spcPct val="90000"/>
-              </a:lnSpc>
+            <a:lvl4pPr marL="1600200" indent="-228600" algn="l" defTabSz="457200" rtl="0" eaLnBrk="1" latinLnBrk="0" hangingPunct="1">
               <a:spcBef>
-                <a:spcPts val="500"/>
+                <a:spcPts val="1000"/>
               </a:spcBef>
-              <a:buFont typeface="Arial" panose="020B0604020202020204" pitchFamily="34" charset="0"/>
-              <a:buChar char="•"/>
-              <a:defRPr sz="1800" kern="1200">
+              <a:spcAft>
+                <a:spcPts val="0"/>
+              </a:spcAft>
+              <a:buClr>
+                <a:schemeClr val="accent1"/>
+              </a:buClr>
+              <a:buSzPct val="80000"/>
+              <a:buFont typeface="Wingdings 3" charset="2"/>
+              <a:buChar char=""/>
+              <a:defRPr sz="1200" kern="1200">
                 <a:solidFill>
-                  <a:schemeClr val="tx1"/>
+                  <a:schemeClr val="tx1">
+                    <a:lumMod val="75000"/>
+                    <a:lumOff val="25000"/>
+                  </a:schemeClr>
                 </a:solidFill>
                 <a:latin typeface="+mn-lt"/>
                 <a:ea typeface="+mn-ea"/>
                 <a:cs typeface="+mn-cs"/>
               </a:defRPr>
             </a:lvl4pPr>
-            <a:lvl5pPr marL="2057400" indent="-228600" algn="l" defTabSz="914400" rtl="0" eaLnBrk="1" latinLnBrk="0" hangingPunct="1">
-              <a:lnSpc>
-                <a:spcPct val="90000"/>
-              </a:lnSpc>
+            <a:lvl5pPr marL="2057400" indent="-228600" algn="l" defTabSz="457200" rtl="0" eaLnBrk="1" latinLnBrk="0" hangingPunct="1">
               <a:spcBef>
-                <a:spcPts val="500"/>
+                <a:spcPts val="1000"/>
               </a:spcBef>
-              <a:buFont typeface="Arial" panose="020B0604020202020204" pitchFamily="34" charset="0"/>
-              <a:buChar char="•"/>
-              <a:defRPr sz="1800" kern="1200">
+              <a:spcAft>
+                <a:spcPts val="0"/>
+              </a:spcAft>
+              <a:buClr>
+                <a:schemeClr val="accent1"/>
+              </a:buClr>
+              <a:buSzPct val="80000"/>
+              <a:buFont typeface="Wingdings 3" charset="2"/>
+              <a:buChar char=""/>
+              <a:defRPr sz="1200" kern="1200">
                 <a:solidFill>
-                  <a:schemeClr val="tx1"/>
+                  <a:schemeClr val="tx1">
+                    <a:lumMod val="75000"/>
+                    <a:lumOff val="25000"/>
+                  </a:schemeClr>
                 </a:solidFill>
                 <a:latin typeface="+mn-lt"/>
                 <a:ea typeface="+mn-ea"/>
                 <a:cs typeface="+mn-cs"/>
               </a:defRPr>
             </a:lvl5pPr>
-            <a:lvl6pPr marL="2514600" indent="-228600" algn="l" defTabSz="914400" rtl="0" eaLnBrk="1" latinLnBrk="0" hangingPunct="1">
-              <a:lnSpc>
-                <a:spcPct val="90000"/>
-              </a:lnSpc>
+            <a:lvl6pPr marL="2514600" indent="-228600" algn="l" defTabSz="457200" rtl="0" eaLnBrk="1" latinLnBrk="0" hangingPunct="1">
               <a:spcBef>
-                <a:spcPts val="500"/>
+                <a:spcPts val="1000"/>
               </a:spcBef>
-              <a:buFont typeface="Arial" panose="020B0604020202020204" pitchFamily="34" charset="0"/>
-              <a:buChar char="•"/>
-              <a:defRPr sz="1800" kern="1200">
+              <a:spcAft>
+                <a:spcPts val="0"/>
+              </a:spcAft>
+              <a:buClr>
+                <a:schemeClr val="accent1"/>
+              </a:buClr>
+              <a:buSzPct val="80000"/>
+              <a:buFont typeface="Wingdings 3" charset="2"/>
+              <a:buChar char=""/>
+              <a:defRPr sz="1200" kern="1200">
                 <a:solidFill>
-                  <a:schemeClr val="tx1"/>
+                  <a:schemeClr val="tx1">
+                    <a:lumMod val="75000"/>
+                    <a:lumOff val="25000"/>
+                  </a:schemeClr>
                 </a:solidFill>
                 <a:latin typeface="+mn-lt"/>
                 <a:ea typeface="+mn-ea"/>
                 <a:cs typeface="+mn-cs"/>
               </a:defRPr>
             </a:lvl6pPr>
-            <a:lvl7pPr marL="2971800" indent="-228600" algn="l" defTabSz="914400" rtl="0" eaLnBrk="1" latinLnBrk="0" hangingPunct="1">
-              <a:lnSpc>
-                <a:spcPct val="90000"/>
-              </a:lnSpc>
+            <a:lvl7pPr marL="2971800" indent="-228600" algn="l" defTabSz="457200" rtl="0" eaLnBrk="1" latinLnBrk="0" hangingPunct="1">
               <a:spcBef>
-                <a:spcPts val="500"/>
+                <a:spcPts val="1000"/>
               </a:spcBef>
-              <a:buFont typeface="Arial" panose="020B0604020202020204" pitchFamily="34" charset="0"/>
-              <a:buChar char="•"/>
-              <a:defRPr sz="1800" kern="1200">
+              <a:spcAft>
+                <a:spcPts val="0"/>
+              </a:spcAft>
+              <a:buClr>
+                <a:schemeClr val="accent1"/>
+              </a:buClr>
+              <a:buSzPct val="80000"/>
+              <a:buFont typeface="Wingdings 3" charset="2"/>
+              <a:buChar char=""/>
+              <a:defRPr sz="1200" kern="1200">
                 <a:solidFill>
-                  <a:schemeClr val="tx1"/>
+                  <a:schemeClr val="tx1">
+                    <a:lumMod val="75000"/>
+                    <a:lumOff val="25000"/>
+                  </a:schemeClr>
                 </a:solidFill>
                 <a:latin typeface="+mn-lt"/>
                 <a:ea typeface="+mn-ea"/>
                 <a:cs typeface="+mn-cs"/>
               </a:defRPr>
             </a:lvl7pPr>
-            <a:lvl8pPr marL="3429000" indent="-228600" algn="l" defTabSz="914400" rtl="0" eaLnBrk="1" latinLnBrk="0" hangingPunct="1">
-              <a:lnSpc>
-                <a:spcPct val="90000"/>
-              </a:lnSpc>
+            <a:lvl8pPr marL="3429000" indent="-228600" algn="l" defTabSz="457200" rtl="0" eaLnBrk="1" latinLnBrk="0" hangingPunct="1">
               <a:spcBef>
-                <a:spcPts val="500"/>
+                <a:spcPts val="1000"/>
               </a:spcBef>
-              <a:buFont typeface="Arial" panose="020B0604020202020204" pitchFamily="34" charset="0"/>
-              <a:buChar char="•"/>
-              <a:defRPr sz="1800" kern="1200">
+              <a:spcAft>
+                <a:spcPts val="0"/>
+              </a:spcAft>
+              <a:buClr>
+                <a:schemeClr val="accent1"/>
+              </a:buClr>
+              <a:buSzPct val="80000"/>
+              <a:buFont typeface="Wingdings 3" charset="2"/>
+              <a:buChar char=""/>
+              <a:defRPr sz="1200" kern="1200">
                 <a:solidFill>
-                  <a:schemeClr val="tx1"/>
+                  <a:schemeClr val="tx1">
+                    <a:lumMod val="75000"/>
+                    <a:lumOff val="25000"/>
+                  </a:schemeClr>
                 </a:solidFill>
                 <a:latin typeface="+mn-lt"/>
                 <a:ea typeface="+mn-ea"/>
                 <a:cs typeface="+mn-cs"/>
               </a:defRPr>
             </a:lvl8pPr>
-            <a:lvl9pPr marL="3886200" indent="-228600" algn="l" defTabSz="914400" rtl="0" eaLnBrk="1" latinLnBrk="0" hangingPunct="1">
-              <a:lnSpc>
-                <a:spcPct val="90000"/>
-              </a:lnSpc>
+            <a:lvl9pPr marL="3886200" indent="-228600" algn="l" defTabSz="457200" rtl="0" eaLnBrk="1" latinLnBrk="0" hangingPunct="1">
               <a:spcBef>
-                <a:spcPts val="500"/>
+                <a:spcPts val="1000"/>
               </a:spcBef>
-              <a:buFont typeface="Arial" panose="020B0604020202020204" pitchFamily="34" charset="0"/>
-              <a:buChar char="•"/>
-              <a:defRPr sz="1800" kern="1200">
+              <a:spcAft>
+                <a:spcPts val="0"/>
+              </a:spcAft>
+              <a:buClr>
+                <a:schemeClr val="accent1"/>
+              </a:buClr>
+              <a:buSzPct val="80000"/>
+              <a:buFont typeface="Wingdings 3" charset="2"/>
+              <a:buChar char=""/>
+              <a:defRPr sz="1200" kern="1200">
                 <a:solidFill>
-                  <a:schemeClr val="tx1"/>
+                  <a:schemeClr val="tx1">
+                    <a:lumMod val="75000"/>
+                    <a:lumOff val="25000"/>
+                  </a:schemeClr>
                 </a:solidFill>
                 <a:latin typeface="+mn-lt"/>
                 <a:ea typeface="+mn-ea"/>
@@ -12597,7 +12713,7 @@
           <a:p>
             <a:r>
               <a:rPr lang="en-US" dirty="0"/>
-              <a:t>To revert a file back to the time it is last committed use “checkout”:</a:t>
+              <a:t>To reverse a file back to the time it is last committed use “checkout”:</a:t>
             </a:r>
           </a:p>
           <a:p>
@@ -12606,7 +12722,7 @@
             </a:pPr>
             <a:r>
               <a:rPr lang="en-US" dirty="0"/>
-              <a:t>	$ git checkout – FILE_NAME</a:t>
+              <a:t>	$ git checkout – &lt;FILE_NAME&gt;</a:t>
             </a:r>
           </a:p>
           <a:p>
@@ -15634,6 +15750,21 @@
             <a:r>
               <a:rPr lang="en-US" dirty="0"/>
               <a:t> - View the history of all changes.</a:t>
+            </a:r>
+          </a:p>
+          <a:p>
+            <a:pPr marL="0" indent="0">
+              <a:buNone/>
+            </a:pPr>
+            <a:endParaRPr lang="en-US" dirty="0"/>
+          </a:p>
+          <a:p>
+            <a:pPr marL="0" indent="0">
+              <a:buNone/>
+            </a:pPr>
+            <a:r>
+              <a:rPr lang="en-US" dirty="0"/>
+              <a:t>Note: In more than two people in your team change the same file in the same line, there will be a conflict.</a:t>
             </a:r>
           </a:p>
         </p:txBody>

</xml_diff>